<commit_message>
Actualizando la estructura del taller  y los instructores.
</commit_message>
<xml_diff>
--- a/01.-Promocionales/Promoción_Conferencia_de_Vitali_Herrera.pptx
+++ b/01.-Promocionales/Promoción_Conferencia_de_Vitali_Herrera.pptx
@@ -383,7 +383,7 @@
           <a:p>
             <a:fld id="{40771E8B-6CA5-40B2-8038-0E112F3DAC1C}" type="datetimeFigureOut">
               <a:rPr lang="es-ES" smtClean="0"/>
-              <a:t>01/04/2024</a:t>
+              <a:t>02/04/2024</a:t>
             </a:fld>
             <a:endParaRPr lang="es-ES"/>
           </a:p>
@@ -553,7 +553,7 @@
           <a:p>
             <a:fld id="{40771E8B-6CA5-40B2-8038-0E112F3DAC1C}" type="datetimeFigureOut">
               <a:rPr lang="es-ES" smtClean="0"/>
-              <a:t>01/04/2024</a:t>
+              <a:t>02/04/2024</a:t>
             </a:fld>
             <a:endParaRPr lang="es-ES"/>
           </a:p>
@@ -733,7 +733,7 @@
           <a:p>
             <a:fld id="{40771E8B-6CA5-40B2-8038-0E112F3DAC1C}" type="datetimeFigureOut">
               <a:rPr lang="es-ES" smtClean="0"/>
-              <a:t>01/04/2024</a:t>
+              <a:t>02/04/2024</a:t>
             </a:fld>
             <a:endParaRPr lang="es-ES"/>
           </a:p>
@@ -903,7 +903,7 @@
           <a:p>
             <a:fld id="{40771E8B-6CA5-40B2-8038-0E112F3DAC1C}" type="datetimeFigureOut">
               <a:rPr lang="es-ES" smtClean="0"/>
-              <a:t>01/04/2024</a:t>
+              <a:t>02/04/2024</a:t>
             </a:fld>
             <a:endParaRPr lang="es-ES"/>
           </a:p>
@@ -1149,7 +1149,7 @@
           <a:p>
             <a:fld id="{40771E8B-6CA5-40B2-8038-0E112F3DAC1C}" type="datetimeFigureOut">
               <a:rPr lang="es-ES" smtClean="0"/>
-              <a:t>01/04/2024</a:t>
+              <a:t>02/04/2024</a:t>
             </a:fld>
             <a:endParaRPr lang="es-ES"/>
           </a:p>
@@ -1381,7 +1381,7 @@
           <a:p>
             <a:fld id="{40771E8B-6CA5-40B2-8038-0E112F3DAC1C}" type="datetimeFigureOut">
               <a:rPr lang="es-ES" smtClean="0"/>
-              <a:t>01/04/2024</a:t>
+              <a:t>02/04/2024</a:t>
             </a:fld>
             <a:endParaRPr lang="es-ES"/>
           </a:p>
@@ -1748,7 +1748,7 @@
           <a:p>
             <a:fld id="{40771E8B-6CA5-40B2-8038-0E112F3DAC1C}" type="datetimeFigureOut">
               <a:rPr lang="es-ES" smtClean="0"/>
-              <a:t>01/04/2024</a:t>
+              <a:t>02/04/2024</a:t>
             </a:fld>
             <a:endParaRPr lang="es-ES"/>
           </a:p>
@@ -1866,7 +1866,7 @@
           <a:p>
             <a:fld id="{40771E8B-6CA5-40B2-8038-0E112F3DAC1C}" type="datetimeFigureOut">
               <a:rPr lang="es-ES" smtClean="0"/>
-              <a:t>01/04/2024</a:t>
+              <a:t>02/04/2024</a:t>
             </a:fld>
             <a:endParaRPr lang="es-ES"/>
           </a:p>
@@ -1961,7 +1961,7 @@
           <a:p>
             <a:fld id="{40771E8B-6CA5-40B2-8038-0E112F3DAC1C}" type="datetimeFigureOut">
               <a:rPr lang="es-ES" smtClean="0"/>
-              <a:t>01/04/2024</a:t>
+              <a:t>02/04/2024</a:t>
             </a:fld>
             <a:endParaRPr lang="es-ES"/>
           </a:p>
@@ -2238,7 +2238,7 @@
           <a:p>
             <a:fld id="{40771E8B-6CA5-40B2-8038-0E112F3DAC1C}" type="datetimeFigureOut">
               <a:rPr lang="es-ES" smtClean="0"/>
-              <a:t>01/04/2024</a:t>
+              <a:t>02/04/2024</a:t>
             </a:fld>
             <a:endParaRPr lang="es-ES"/>
           </a:p>
@@ -2495,7 +2495,7 @@
           <a:p>
             <a:fld id="{40771E8B-6CA5-40B2-8038-0E112F3DAC1C}" type="datetimeFigureOut">
               <a:rPr lang="es-ES" smtClean="0"/>
-              <a:t>01/04/2024</a:t>
+              <a:t>02/04/2024</a:t>
             </a:fld>
             <a:endParaRPr lang="es-ES"/>
           </a:p>
@@ -2706,7 +2706,7 @@
           <a:p>
             <a:fld id="{40771E8B-6CA5-40B2-8038-0E112F3DAC1C}" type="datetimeFigureOut">
               <a:rPr lang="es-ES" smtClean="0"/>
-              <a:t>01/04/2024</a:t>
+              <a:t>02/04/2024</a:t>
             </a:fld>
             <a:endParaRPr lang="es-ES"/>
           </a:p>
@@ -3212,7 +3212,7 @@
         </p:nvSpPr>
         <p:spPr>
           <a:xfrm>
-            <a:off x="809097" y="1126091"/>
+            <a:off x="809097" y="1423784"/>
             <a:ext cx="11367232" cy="984885"/>
           </a:xfrm>
           <a:prstGeom prst="rect">
@@ -3313,8 +3313,8 @@
         </p:nvSpPr>
         <p:spPr>
           <a:xfrm>
-            <a:off x="7949150" y="7367735"/>
-            <a:ext cx="4234962" cy="2154436"/>
+            <a:off x="7941367" y="8370888"/>
+            <a:ext cx="4234962" cy="2523768"/>
           </a:xfrm>
           <a:prstGeom prst="rect">
             <a:avLst/>
@@ -3349,13 +3349,10 @@
           </a:p>
           <a:p>
             <a:r>
-              <a:rPr lang="es-ES" sz="2400" dirty="0">
+              <a:rPr lang="es-MX" sz="2400" dirty="0">
                 <a:solidFill>
                   <a:srgbClr val="847770"/>
                 </a:solidFill>
-                <a:highlight>
-                  <a:srgbClr val="FFFF00"/>
-                </a:highlight>
                 <a:latin typeface="Lucida Sans"/>
                 <a:ea typeface="+mn-lt"/>
                 <a:cs typeface="+mn-lt"/>
@@ -3363,87 +3360,35 @@
               <a:t>Auditorio Xavier </a:t>
             </a:r>
             <a:r>
-              <a:rPr lang="es-ES" sz="2400" dirty="0" err="1">
+              <a:rPr lang="es-MX" sz="2400" dirty="0" err="1">
                 <a:solidFill>
                   <a:srgbClr val="847770"/>
                 </a:solidFill>
-                <a:highlight>
-                  <a:srgbClr val="FFFF00"/>
-                </a:highlight>
                 <a:latin typeface="Lucida Sans"/>
                 <a:ea typeface="+mn-lt"/>
                 <a:cs typeface="+mn-lt"/>
               </a:rPr>
-              <a:t>Schifler</a:t>
-            </a:r>
-            <a:r>
-              <a:rPr lang="es-ES" sz="2400" dirty="0">
+              <a:t>Scheifler</a:t>
+            </a:r>
+            <a:r>
+              <a:rPr lang="es-MX" sz="2400" dirty="0">
                 <a:solidFill>
                   <a:srgbClr val="847770"/>
                 </a:solidFill>
-                <a:highlight>
-                  <a:srgbClr val="FFFF00"/>
-                </a:highlight>
                 <a:latin typeface="Lucida Sans"/>
                 <a:ea typeface="+mn-lt"/>
                 <a:cs typeface="+mn-lt"/>
               </a:rPr>
-              <a:t> y Amezaga</a:t>
-            </a:r>
-          </a:p>
-        </p:txBody>
-      </p:sp>
-      <p:sp>
-        <p:nvSpPr>
-          <p:cNvPr id="19" name="Rectángulo 18">
-            <a:extLst>
-              <a:ext uri="{FF2B5EF4-FFF2-40B4-BE49-F238E27FC236}">
-                <a16:creationId xmlns:a16="http://schemas.microsoft.com/office/drawing/2014/main" id="{31954790-B674-8D63-01EC-C576F55BB7FB}"/>
-              </a:ext>
-            </a:extLst>
-          </p:cNvPr>
-          <p:cNvSpPr>
-            <a:spLocks noChangeAspect="1"/>
-          </p:cNvSpPr>
-          <p:nvPr/>
-        </p:nvSpPr>
-        <p:spPr>
-          <a:xfrm>
-            <a:off x="10585001" y="6796962"/>
-            <a:ext cx="1384788" cy="1384788"/>
-          </a:xfrm>
-          <a:prstGeom prst="rect">
-            <a:avLst/>
-          </a:prstGeom>
-          <a:solidFill>
-            <a:schemeClr val="bg1"/>
-          </a:solidFill>
-          <a:ln>
-            <a:noFill/>
-          </a:ln>
-        </p:spPr>
-        <p:style>
-          <a:lnRef idx="2">
-            <a:schemeClr val="accent1">
-              <a:shade val="50000"/>
-            </a:schemeClr>
-          </a:lnRef>
-          <a:fillRef idx="1">
-            <a:schemeClr val="accent1"/>
-          </a:fillRef>
-          <a:effectRef idx="0">
-            <a:schemeClr val="accent1"/>
-          </a:effectRef>
-          <a:fontRef idx="minor">
-            <a:schemeClr val="lt1"/>
-          </a:fontRef>
-        </p:style>
-        <p:txBody>
-          <a:bodyPr rtlCol="0" anchor="ctr"/>
-          <a:lstStyle/>
-          <a:p>
-            <a:pPr algn="ctr"/>
-            <a:endParaRPr lang="es-ES"/>
+              <a:t> y de Amézaga, (edificio S, segundo nivel 2).</a:t>
+            </a:r>
+            <a:endParaRPr lang="es-ES" sz="2400" dirty="0">
+              <a:solidFill>
+                <a:srgbClr val="847770"/>
+              </a:solidFill>
+              <a:latin typeface="Lucida Sans"/>
+              <a:ea typeface="+mn-lt"/>
+              <a:cs typeface="+mn-lt"/>
+            </a:endParaRPr>
           </a:p>
         </p:txBody>
       </p:sp>
@@ -3535,7 +3480,7 @@
         <p:spPr>
           <a:xfrm>
             <a:off x="879817" y="7367735"/>
-            <a:ext cx="6484327" cy="3693319"/>
+            <a:ext cx="6484327" cy="4247317"/>
           </a:xfrm>
           <a:prstGeom prst="rect">
             <a:avLst/>
@@ -3559,6 +3504,16 @@
               </a:rPr>
               <a:t>Objetivo</a:t>
             </a:r>
+          </a:p>
+          <a:p>
+            <a:endParaRPr lang="es-ES" sz="3600" b="1" dirty="0">
+              <a:solidFill>
+                <a:srgbClr val="847770"/>
+              </a:solidFill>
+              <a:latin typeface="Sitka Heading"/>
+              <a:ea typeface="+mn-lt"/>
+              <a:cs typeface="Calibri"/>
+            </a:endParaRPr>
           </a:p>
           <a:p>
             <a:r>
@@ -3677,7 +3632,7 @@
           <p:nvPr/>
         </p:nvPicPr>
         <p:blipFill>
-          <a:blip r:embed="rId3">
+          <a:blip r:embed="rId3" cstate="print">
             <a:extLst>
               <a:ext uri="{28A0092B-C50C-407E-A947-70E740481C1C}">
                 <a14:useLocalDpi xmlns:a14="http://schemas.microsoft.com/office/drawing/2010/main" val="0"/>
@@ -3787,7 +3742,7 @@
           <p:nvPr/>
         </p:nvPicPr>
         <p:blipFill>
-          <a:blip r:embed="rId6">
+          <a:blip r:embed="rId6" cstate="print">
             <a:extLst>
               <a:ext uri="{28A0092B-C50C-407E-A947-70E740481C1C}">
                 <a14:useLocalDpi xmlns:a14="http://schemas.microsoft.com/office/drawing/2010/main" val="0"/>

</xml_diff>